<commit_message>
Change figures and documentation
</commit_message>
<xml_diff>
--- a/docs/diagrams/RemoveGroupCommandUML.pptx
+++ b/docs/diagrams/RemoveGroupCommandUML.pptx
@@ -104,6 +104,11 @@
       </a:defRPr>
     </a:lvl9pPr>
   </p:defaultTextStyle>
+  <p:extLst>
+    <p:ext uri="{EFAFB233-063F-42B5-8137-9DF3F51BA10A}">
+      <p15:sldGuideLst xmlns:p15="http://schemas.microsoft.com/office/powerpoint/2012/main"/>
+    </p:ext>
+  </p:extLst>
 </p:presentation>
 </file>
 
@@ -3496,7 +3501,7 @@
                   </a:outerShdw>
                 </a:effectLst>
               </a:rPr>
-              <a:t>RemoveGroup</a:t>
+              <a:t>DeleteGroup</a:t>
             </a:r>
             <a:endParaRPr lang="en-US" b="1" dirty="0">
               <a:ln w="10160">

</xml_diff>